<commit_message>
Update CSS presentation slide
</commit_message>
<xml_diff>
--- a/presentation_slides/CSS.pptx
+++ b/presentation_slides/CSS.pptx
@@ -1059,7 +1059,7 @@
           <a:p>
             <a:r>
               <a:rPr lang="en-NZ" dirty="0"/>
-              <a:t>Flexbox and grid are the centrepiece that controls the layout of the webpage. Flex and grid are the inner display style that we can set on our element on the box. With flexbox, you can lay elements out horizontally or vertically which depends on the direction of our primary axis (do an example on Paint). With grid, it’s very much like a table, where you divides the box up into cells. You may ask, should I use grid or flexbox? I am sorry, there isn’t a clear-cut answer, because what can be done by grid can also be achieved through flexbox. A distinction should be made though, flexbox focuses on the control flow, that is the flex item can stretch or shrink. (Example on CSS tricks) Grid focuses on content placement, for example, a grid is broken into several cells horizontally and vertically. A big distinction pointed out Mozilla is flexbox controls the space distribution on either row or column. Whereas grid can control the space distribution both at the same time. (Show the example, </a:t>
+              <a:t>Flexbox and grid are the centrepiece that controls the layout of the webpage. Flex and grid are the inner display style that we can set on the box. With flexbox, you can lay elements out horizontally or vertically which depends on the direction of our primary axis (do an example on Paint). With grid, it’s very much like a table, where you divides the box up into cells. You may ask, should I use grid or flexbox? I am sorry, there isn’t a clear-cut answer, because what can be done by grid can also be achieved through flexbox. A distinction should be made though, flexbox focuses on the control flow, that is the flex item can stretch or shrink. (Example on CSS tricks) Grid focuses on content placement, for example, a grid is broken into several cells horizontally and vertically. A big distinction pointed out Mozilla is flexbox controls the space distribution on either row or column. Whereas grid can control the space distribution both at the same time. (Show the example, </a:t>
             </a:r>
             <a:r>
               <a:rPr lang="en-NZ" dirty="0">
@@ -5608,21 +5608,6 @@
 </file>
 
 <file path=customXml/item1.xml><?xml version="1.0" encoding="utf-8"?>
-<p:properties xmlns:p="http://schemas.microsoft.com/office/2006/metadata/properties" xmlns:xsi="http://www.w3.org/2001/XMLSchema-instance" xmlns:pc="http://schemas.microsoft.com/office/infopath/2007/PartnerControls">
-  <documentManagement/>
-</p:properties>
-</file>
-
-<file path=customXml/item2.xml><?xml version="1.0" encoding="utf-8"?>
-<?mso-contentType ?>
-<FormTemplates xmlns="http://schemas.microsoft.com/sharepoint/v3/contenttype/forms">
-  <Display>DocumentLibraryForm</Display>
-  <Edit>DocumentLibraryForm</Edit>
-  <New>DocumentLibraryForm</New>
-</FormTemplates>
-</file>
-
-<file path=customXml/item3.xml><?xml version="1.0" encoding="utf-8"?>
 <ct:contentTypeSchema xmlns:ct="http://schemas.microsoft.com/office/2006/metadata/contentType" xmlns:ma="http://schemas.microsoft.com/office/2006/metadata/properties/metaAttributes" ct:_="" ma:_="" ma:contentTypeName="Document" ma:contentTypeID="0x010100E93C242A5CEB2D47B470CCC9086D4F41" ma:contentTypeVersion="8" ma:contentTypeDescription="Create a new document." ma:contentTypeScope="" ma:versionID="9f247184716c8b822e3549056a62d5ca">
   <xsd:schema xmlns:xsd="http://www.w3.org/2001/XMLSchema" xmlns:xs="http://www.w3.org/2001/XMLSchema" xmlns:p="http://schemas.microsoft.com/office/2006/metadata/properties" xmlns:ns2="b7ac0d6e-52d3-4232-9ee4-5c4d9894bf3c" targetNamespace="http://schemas.microsoft.com/office/2006/metadata/properties" ma:root="true" ma:fieldsID="067541c65ced21005bd2e6630d9f2f27" ns2:_="">
     <xsd:import namespace="b7ac0d6e-52d3-4232-9ee4-5c4d9894bf3c"/>
@@ -5794,31 +5779,22 @@
 </ct:contentTypeSchema>
 </file>
 
-<file path=customXml/itemProps1.xml><?xml version="1.0" encoding="utf-8"?>
-<ds:datastoreItem xmlns:ds="http://schemas.openxmlformats.org/officeDocument/2006/customXml" ds:itemID="{68BBE704-B474-4F72-9E56-BC8B9AC8B9DF}">
-  <ds:schemaRefs>
-    <ds:schemaRef ds:uri="http://purl.org/dc/terms/"/>
-    <ds:schemaRef ds:uri="http://schemas.openxmlformats.org/package/2006/metadata/core-properties"/>
-    <ds:schemaRef ds:uri="http://schemas.microsoft.com/office/2006/documentManagement/types"/>
-    <ds:schemaRef ds:uri="http://purl.org/dc/dcmitype/"/>
-    <ds:schemaRef ds:uri="http://schemas.microsoft.com/office/infopath/2007/PartnerControls"/>
-    <ds:schemaRef ds:uri="b7ac0d6e-52d3-4232-9ee4-5c4d9894bf3c"/>
-    <ds:schemaRef ds:uri="http://purl.org/dc/elements/1.1/"/>
-    <ds:schemaRef ds:uri="http://schemas.microsoft.com/office/2006/metadata/properties"/>
-    <ds:schemaRef ds:uri="http://www.w3.org/XML/1998/namespace"/>
-  </ds:schemaRefs>
-</ds:datastoreItem>
+<file path=customXml/item2.xml><?xml version="1.0" encoding="utf-8"?>
+<?mso-contentType ?>
+<FormTemplates xmlns="http://schemas.microsoft.com/sharepoint/v3/contenttype/forms">
+  <Display>DocumentLibraryForm</Display>
+  <Edit>DocumentLibraryForm</Edit>
+  <New>DocumentLibraryForm</New>
+</FormTemplates>
 </file>
 
-<file path=customXml/itemProps2.xml><?xml version="1.0" encoding="utf-8"?>
-<ds:datastoreItem xmlns:ds="http://schemas.openxmlformats.org/officeDocument/2006/customXml" ds:itemID="{0FD5B65A-65A2-4216-AFFD-8C37DA453243}">
-  <ds:schemaRefs>
-    <ds:schemaRef ds:uri="http://schemas.microsoft.com/sharepoint/v3/contenttype/forms"/>
-  </ds:schemaRefs>
-</ds:datastoreItem>
+<file path=customXml/item3.xml><?xml version="1.0" encoding="utf-8"?>
+<p:properties xmlns:p="http://schemas.microsoft.com/office/2006/metadata/properties" xmlns:xsi="http://www.w3.org/2001/XMLSchema-instance" xmlns:pc="http://schemas.microsoft.com/office/infopath/2007/PartnerControls">
+  <documentManagement/>
+</p:properties>
 </file>
 
-<file path=customXml/itemProps3.xml><?xml version="1.0" encoding="utf-8"?>
+<file path=customXml/itemProps1.xml><?xml version="1.0" encoding="utf-8"?>
 <ds:datastoreItem xmlns:ds="http://schemas.openxmlformats.org/officeDocument/2006/customXml" ds:itemID="{9B01F9E2-828F-4555-99E5-FC208D4750F5}">
   <ds:schemaRefs>
     <ds:schemaRef ds:uri="http://schemas.microsoft.com/office/2006/metadata/contentType"/>
@@ -5834,4 +5810,28 @@
     <ds:schemaRef ds:uri="http://schemas.microsoft.com/internal/obd"/>
   </ds:schemaRefs>
 </ds:datastoreItem>
+</file>
+
+<file path=customXml/itemProps2.xml><?xml version="1.0" encoding="utf-8"?>
+<ds:datastoreItem xmlns:ds="http://schemas.openxmlformats.org/officeDocument/2006/customXml" ds:itemID="{0FD5B65A-65A2-4216-AFFD-8C37DA453243}">
+  <ds:schemaRefs>
+    <ds:schemaRef ds:uri="http://schemas.microsoft.com/sharepoint/v3/contenttype/forms"/>
+  </ds:schemaRefs>
+</ds:datastoreItem>
+</file>
+
+<file path=customXml/itemProps3.xml><?xml version="1.0" encoding="utf-8"?>
+<ds:datastoreItem xmlns:ds="http://schemas.openxmlformats.org/officeDocument/2006/customXml" ds:itemID="{68BBE704-B474-4F72-9E56-BC8B9AC8B9DF}">
+  <ds:schemaRefs>
+    <ds:schemaRef ds:uri="http://purl.org/dc/terms/"/>
+    <ds:schemaRef ds:uri="http://schemas.openxmlformats.org/package/2006/metadata/core-properties"/>
+    <ds:schemaRef ds:uri="http://schemas.microsoft.com/office/2006/documentManagement/types"/>
+    <ds:schemaRef ds:uri="http://purl.org/dc/dcmitype/"/>
+    <ds:schemaRef ds:uri="http://schemas.microsoft.com/office/infopath/2007/PartnerControls"/>
+    <ds:schemaRef ds:uri="b7ac0d6e-52d3-4232-9ee4-5c4d9894bf3c"/>
+    <ds:schemaRef ds:uri="http://purl.org/dc/elements/1.1/"/>
+    <ds:schemaRef ds:uri="http://schemas.microsoft.com/office/2006/metadata/properties"/>
+    <ds:schemaRef ds:uri="http://www.w3.org/XML/1998/namespace"/>
+  </ds:schemaRefs>
+</ds:datastoreItem>
 </file>
</xml_diff>